<commit_message>
Documentation (sle-2015, atomic-petrinets/profiling): Updated figures according to style guides.
</commit_message>
<xml_diff>
--- a/profiling/atomic-petrinets/documentation/figures/non-hierarchical-profiling-net.pptx
+++ b/profiling/atomic-petrinets/documentation/figures/non-hierarchical-profiling-net.pptx
@@ -288,7 +288,7 @@
           <a:p>
             <a:fld id="{7F75D886-B4B5-1440-A7E1-77B775AC7378}" type="datetimeFigureOut">
               <a:rPr lang="en-US" smtClean="0"/>
-              <a:t>27/01/16</a:t>
+              <a:t>08/05/16</a:t>
             </a:fld>
             <a:endParaRPr lang="en-GB"/>
           </a:p>
@@ -458,7 +458,7 @@
           <a:p>
             <a:fld id="{7F75D886-B4B5-1440-A7E1-77B775AC7378}" type="datetimeFigureOut">
               <a:rPr lang="en-US" smtClean="0"/>
-              <a:t>27/01/16</a:t>
+              <a:t>08/05/16</a:t>
             </a:fld>
             <a:endParaRPr lang="en-GB"/>
           </a:p>
@@ -638,7 +638,7 @@
           <a:p>
             <a:fld id="{7F75D886-B4B5-1440-A7E1-77B775AC7378}" type="datetimeFigureOut">
               <a:rPr lang="en-US" smtClean="0"/>
-              <a:t>27/01/16</a:t>
+              <a:t>08/05/16</a:t>
             </a:fld>
             <a:endParaRPr lang="en-GB"/>
           </a:p>
@@ -808,7 +808,7 @@
           <a:p>
             <a:fld id="{7F75D886-B4B5-1440-A7E1-77B775AC7378}" type="datetimeFigureOut">
               <a:rPr lang="en-US" smtClean="0"/>
-              <a:t>27/01/16</a:t>
+              <a:t>08/05/16</a:t>
             </a:fld>
             <a:endParaRPr lang="en-GB"/>
           </a:p>
@@ -1054,7 +1054,7 @@
           <a:p>
             <a:fld id="{7F75D886-B4B5-1440-A7E1-77B775AC7378}" type="datetimeFigureOut">
               <a:rPr lang="en-US" smtClean="0"/>
-              <a:t>27/01/16</a:t>
+              <a:t>08/05/16</a:t>
             </a:fld>
             <a:endParaRPr lang="en-GB"/>
           </a:p>
@@ -1342,7 +1342,7 @@
           <a:p>
             <a:fld id="{7F75D886-B4B5-1440-A7E1-77B775AC7378}" type="datetimeFigureOut">
               <a:rPr lang="en-US" smtClean="0"/>
-              <a:t>27/01/16</a:t>
+              <a:t>08/05/16</a:t>
             </a:fld>
             <a:endParaRPr lang="en-GB"/>
           </a:p>
@@ -1764,7 +1764,7 @@
           <a:p>
             <a:fld id="{7F75D886-B4B5-1440-A7E1-77B775AC7378}" type="datetimeFigureOut">
               <a:rPr lang="en-US" smtClean="0"/>
-              <a:t>27/01/16</a:t>
+              <a:t>08/05/16</a:t>
             </a:fld>
             <a:endParaRPr lang="en-GB"/>
           </a:p>
@@ -1882,7 +1882,7 @@
           <a:p>
             <a:fld id="{7F75D886-B4B5-1440-A7E1-77B775AC7378}" type="datetimeFigureOut">
               <a:rPr lang="en-US" smtClean="0"/>
-              <a:t>27/01/16</a:t>
+              <a:t>08/05/16</a:t>
             </a:fld>
             <a:endParaRPr lang="en-GB"/>
           </a:p>
@@ -1977,7 +1977,7 @@
           <a:p>
             <a:fld id="{7F75D886-B4B5-1440-A7E1-77B775AC7378}" type="datetimeFigureOut">
               <a:rPr lang="en-US" smtClean="0"/>
-              <a:t>27/01/16</a:t>
+              <a:t>08/05/16</a:t>
             </a:fld>
             <a:endParaRPr lang="en-GB"/>
           </a:p>
@@ -2254,7 +2254,7 @@
           <a:p>
             <a:fld id="{7F75D886-B4B5-1440-A7E1-77B775AC7378}" type="datetimeFigureOut">
               <a:rPr lang="en-US" smtClean="0"/>
-              <a:t>27/01/16</a:t>
+              <a:t>08/05/16</a:t>
             </a:fld>
             <a:endParaRPr lang="en-GB"/>
           </a:p>
@@ -2507,7 +2507,7 @@
           <a:p>
             <a:fld id="{7F75D886-B4B5-1440-A7E1-77B775AC7378}" type="datetimeFigureOut">
               <a:rPr lang="en-US" smtClean="0"/>
-              <a:t>27/01/16</a:t>
+              <a:t>08/05/16</a:t>
             </a:fld>
             <a:endParaRPr lang="en-GB"/>
           </a:p>
@@ -2720,7 +2720,7 @@
           <a:p>
             <a:fld id="{7F75D886-B4B5-1440-A7E1-77B775AC7378}" type="datetimeFigureOut">
               <a:rPr lang="en-US" smtClean="0"/>
-              <a:t>27/01/16</a:t>
+              <a:t>08/05/16</a:t>
             </a:fld>
             <a:endParaRPr lang="en-GB"/>
           </a:p>
@@ -3290,7 +3290,6 @@
                 <a:solidFill>
                   <a:schemeClr val="tx1"/>
                 </a:solidFill>
-                <a:latin typeface="Microsoft Sans Serif"/>
                 <a:cs typeface="Microsoft Sans Serif"/>
               </a:rPr>
               <a:t>Legend</a:t>
@@ -3299,7 +3298,6 @@
               <a:solidFill>
                 <a:schemeClr val="tx1"/>
               </a:solidFill>
-              <a:latin typeface="Microsoft Sans Serif"/>
               <a:cs typeface="Microsoft Sans Serif"/>
             </a:endParaRPr>
           </a:p>
@@ -3315,8 +3313,8 @@
         </p:nvSpPr>
         <p:spPr bwMode="auto">
           <a:xfrm>
-            <a:off x="6348600" y="2312988"/>
-            <a:ext cx="903100" cy="692497"/>
+            <a:off x="6348600" y="2377405"/>
+            <a:ext cx="903100" cy="553998"/>
           </a:xfrm>
           <a:prstGeom prst="rect">
             <a:avLst/>
@@ -3464,7 +3462,7 @@
                 <a:solidFill>
                   <a:schemeClr val="tx1"/>
                 </a:solidFill>
-                <a:latin typeface="Microsoft Sans Serif"/>
+                <a:latin typeface="+mn-lt"/>
                 <a:cs typeface="Microsoft Sans Serif"/>
               </a:rPr>
               <a:t>Base load per</a:t>
@@ -3477,7 +3475,7 @@
                 <a:solidFill>
                   <a:schemeClr val="tx1"/>
                 </a:solidFill>
-                <a:latin typeface="Microsoft Sans Serif"/>
+                <a:latin typeface="+mn-lt"/>
                 <a:cs typeface="Microsoft Sans Serif"/>
               </a:rPr>
               <a:t>transition:</a:t>
@@ -3490,52 +3488,26 @@
                 <a:solidFill>
                   <a:schemeClr val="tx1"/>
                 </a:solidFill>
-                <a:latin typeface="Microsoft Sans Serif"/>
+                <a:latin typeface="+mn-lt"/>
                 <a:cs typeface="Microsoft Sans Serif"/>
               </a:rPr>
-              <a:t>two places,</a:t>
-            </a:r>
-          </a:p>
-          <a:p>
-            <a:pPr eaLnBrk="1" hangingPunct="1"/>
-            <a:r>
-              <a:rPr lang="en-GB" sz="900" b="0" i="1" dirty="0">
-                <a:solidFill>
-                  <a:schemeClr val="tx1"/>
-                </a:solidFill>
-                <a:latin typeface="Microsoft Sans Serif"/>
-                <a:cs typeface="Microsoft Sans Serif"/>
-              </a:rPr>
-              <a:t>e</a:t>
+              <a:t>two places</a:t>
             </a:r>
             <a:r>
               <a:rPr lang="en-GB" sz="900" b="0" i="1" dirty="0" smtClean="0">
                 <a:solidFill>
                   <a:schemeClr val="tx1"/>
                 </a:solidFill>
-                <a:latin typeface="Microsoft Sans Serif"/>
+                <a:latin typeface="+mn-lt"/>
                 <a:cs typeface="Microsoft Sans Serif"/>
               </a:rPr>
-              <a:t>ach three</a:t>
-            </a:r>
-          </a:p>
-          <a:p>
-            <a:pPr eaLnBrk="1" hangingPunct="1"/>
-            <a:r>
-              <a:rPr lang="en-GB" sz="900" b="0" i="1" dirty="0" smtClean="0">
-                <a:solidFill>
-                  <a:schemeClr val="tx1"/>
-                </a:solidFill>
-                <a:latin typeface="Microsoft Sans Serif"/>
-                <a:cs typeface="Microsoft Sans Serif"/>
-              </a:rPr>
-              <a:t>tokens</a:t>
+              <a:t>, each three tokens</a:t>
             </a:r>
             <a:endParaRPr lang="en-GB" sz="900" b="0" i="1" dirty="0">
               <a:solidFill>
                 <a:schemeClr val="tx1"/>
               </a:solidFill>
-              <a:latin typeface="Microsoft Sans Serif"/>
+              <a:latin typeface="+mn-lt"/>
               <a:cs typeface="Microsoft Sans Serif"/>
             </a:endParaRPr>
           </a:p>
@@ -12335,7 +12307,6 @@
               <a:solidFill>
                 <a:schemeClr val="tx1"/>
               </a:solidFill>
-              <a:latin typeface="Microsoft Sans Serif"/>
               <a:cs typeface="Microsoft Sans Serif"/>
             </a:endParaRPr>
           </a:p>
@@ -12426,7 +12397,6 @@
               <a:solidFill>
                 <a:schemeClr val="tx1"/>
               </a:solidFill>
-              <a:latin typeface="Microsoft Sans Serif"/>
               <a:cs typeface="Microsoft Sans Serif"/>
             </a:endParaRPr>
           </a:p>
@@ -12470,7 +12440,6 @@
               <a:solidFill>
                 <a:schemeClr val="tx1"/>
               </a:solidFill>
-              <a:latin typeface="Microsoft Sans Serif"/>
               <a:cs typeface="Microsoft Sans Serif"/>
             </a:endParaRPr>
           </a:p>
@@ -12514,7 +12483,6 @@
               <a:solidFill>
                 <a:schemeClr val="tx1"/>
               </a:solidFill>
-              <a:latin typeface="Microsoft Sans Serif"/>
               <a:cs typeface="Microsoft Sans Serif"/>
             </a:endParaRPr>
           </a:p>
@@ -12558,7 +12526,6 @@
               <a:solidFill>
                 <a:schemeClr val="tx1"/>
               </a:solidFill>
-              <a:latin typeface="Microsoft Sans Serif"/>
               <a:cs typeface="Microsoft Sans Serif"/>
             </a:endParaRPr>
           </a:p>
@@ -12602,7 +12569,6 @@
               <a:solidFill>
                 <a:schemeClr val="tx1"/>
               </a:solidFill>
-              <a:latin typeface="Microsoft Sans Serif"/>
               <a:cs typeface="Microsoft Sans Serif"/>
             </a:endParaRPr>
           </a:p>
@@ -12646,7 +12612,6 @@
               <a:solidFill>
                 <a:schemeClr val="tx1"/>
               </a:solidFill>
-              <a:latin typeface="Microsoft Sans Serif"/>
               <a:cs typeface="Microsoft Sans Serif"/>
             </a:endParaRPr>
           </a:p>
@@ -12690,7 +12655,6 @@
               <a:solidFill>
                 <a:schemeClr val="tx1"/>
               </a:solidFill>
-              <a:latin typeface="Microsoft Sans Serif"/>
               <a:cs typeface="Microsoft Sans Serif"/>
             </a:endParaRPr>
           </a:p>
@@ -12845,7 +12809,7 @@
         </p:nvGrpSpPr>
         <p:grpSpPr>
           <a:xfrm>
-            <a:off x="5628725" y="2379075"/>
+            <a:off x="5648583" y="2377702"/>
             <a:ext cx="642449" cy="591467"/>
             <a:chOff x="4083849" y="2327346"/>
             <a:chExt cx="642449" cy="591467"/>
@@ -13556,8 +13520,8 @@
         </p:nvSpPr>
         <p:spPr bwMode="auto">
           <a:xfrm>
-            <a:off x="6134100" y="3186651"/>
-            <a:ext cx="1060451" cy="830997"/>
+            <a:off x="6188076" y="3186651"/>
+            <a:ext cx="1006476" cy="830997"/>
           </a:xfrm>
           <a:prstGeom prst="rect">
             <a:avLst/>
@@ -13705,7 +13669,7 @@
                 <a:solidFill>
                   <a:schemeClr val="tx1"/>
                 </a:solidFill>
-                <a:latin typeface="Microsoft Sans Serif"/>
+                <a:latin typeface="+mn-lt"/>
                 <a:cs typeface="Microsoft Sans Serif"/>
               </a:rPr>
               <a:t>Invalidation load/</a:t>
@@ -13718,7 +13682,7 @@
                 <a:solidFill>
                   <a:schemeClr val="tx1"/>
                 </a:solidFill>
-                <a:latin typeface="Microsoft Sans Serif"/>
+                <a:latin typeface="+mn-lt"/>
                 <a:cs typeface="Microsoft Sans Serif"/>
               </a:rPr>
               <a:t>c</a:t>
@@ -13728,7 +13692,7 @@
                 <a:solidFill>
                   <a:schemeClr val="tx1"/>
                 </a:solidFill>
-                <a:latin typeface="Microsoft Sans Serif"/>
+                <a:latin typeface="+mn-lt"/>
                 <a:cs typeface="Microsoft Sans Serif"/>
               </a:rPr>
               <a:t>ache potential:</a:t>
@@ -13741,7 +13705,7 @@
                 <a:solidFill>
                   <a:schemeClr val="tx1"/>
                 </a:solidFill>
-                <a:latin typeface="Microsoft Sans Serif"/>
+                <a:latin typeface="+mn-lt"/>
                 <a:cs typeface="Microsoft Sans Serif"/>
               </a:rPr>
               <a:t>three influenced transitions per fired (the fired transition itself</a:t>
@@ -13751,7 +13715,27 @@
                 <a:solidFill>
                   <a:schemeClr val="tx1"/>
                 </a:solidFill>
-                <a:latin typeface="Microsoft Sans Serif"/>
+                <a:latin typeface="+mn-lt"/>
+                <a:cs typeface="Microsoft Sans Serif"/>
+              </a:rPr>
+              <a:t> </a:t>
+            </a:r>
+            <a:r>
+              <a:rPr lang="en-GB" sz="900" b="0" i="1" dirty="0">
+                <a:solidFill>
+                  <a:schemeClr val="tx1"/>
+                </a:solidFill>
+                <a:latin typeface="+mn-lt"/>
+                <a:cs typeface="Microsoft Sans Serif"/>
+              </a:rPr>
+              <a:t>&amp;</a:t>
+            </a:r>
+            <a:r>
+              <a:rPr lang="en-GB" sz="900" b="0" i="1" dirty="0" smtClean="0">
+                <a:solidFill>
+                  <a:schemeClr val="tx1"/>
+                </a:solidFill>
+                <a:latin typeface="+mn-lt"/>
                 <a:cs typeface="Microsoft Sans Serif"/>
               </a:rPr>
               <a:t> </a:t>
@@ -13761,10 +13745,10 @@
                 <a:solidFill>
                   <a:schemeClr val="tx1"/>
                 </a:solidFill>
-                <a:latin typeface="Microsoft Sans Serif"/>
+                <a:latin typeface="+mn-lt"/>
                 <a:cs typeface="Microsoft Sans Serif"/>
               </a:rPr>
-              <a:t>&amp; the next two)</a:t>
+              <a:t>the next two)</a:t>
             </a:r>
           </a:p>
         </p:txBody>
@@ -13781,7 +13765,7 @@
         </p:nvCxnSpPr>
         <p:spPr bwMode="auto">
           <a:xfrm flipH="1">
-            <a:off x="6303533" y="4190368"/>
+            <a:off x="6325758" y="4190368"/>
             <a:ext cx="296864" cy="6620"/>
           </a:xfrm>
           <a:prstGeom prst="line">
@@ -13815,7 +13799,7 @@
         </p:nvCxnSpPr>
         <p:spPr bwMode="auto">
           <a:xfrm flipH="1" flipV="1">
-            <a:off x="5913832" y="3849500"/>
+            <a:off x="5936057" y="3849500"/>
             <a:ext cx="137701" cy="214868"/>
           </a:xfrm>
           <a:prstGeom prst="line">
@@ -13850,7 +13834,7 @@
         </p:nvCxnSpPr>
         <p:spPr bwMode="auto">
           <a:xfrm flipV="1">
-            <a:off x="5720708" y="3380522"/>
+            <a:off x="5742933" y="3380522"/>
             <a:ext cx="57269" cy="210630"/>
           </a:xfrm>
           <a:prstGeom prst="line">
@@ -13885,7 +13869,7 @@
         </p:nvCxnSpPr>
         <p:spPr bwMode="auto">
           <a:xfrm flipH="1" flipV="1">
-            <a:off x="5720708" y="4006077"/>
+            <a:off x="5742933" y="4006077"/>
             <a:ext cx="330825" cy="190911"/>
           </a:xfrm>
           <a:prstGeom prst="line">
@@ -13919,7 +13903,7 @@
         </p:nvCxnSpPr>
         <p:spPr bwMode="auto">
           <a:xfrm flipV="1">
-            <a:off x="5720708" y="3591152"/>
+            <a:off x="5742933" y="3591152"/>
             <a:ext cx="0" cy="418889"/>
           </a:xfrm>
           <a:prstGeom prst="line">
@@ -13951,7 +13935,7 @@
         </p:nvGrpSpPr>
         <p:grpSpPr>
           <a:xfrm rot="9014550">
-            <a:off x="6370089" y="4207711"/>
+            <a:off x="6392314" y="4207711"/>
             <a:ext cx="164527" cy="130300"/>
             <a:chOff x="4467384" y="1963526"/>
             <a:chExt cx="164527" cy="130300"/>
@@ -14058,7 +14042,7 @@
         </p:nvSpPr>
         <p:spPr>
           <a:xfrm>
-            <a:off x="6024168" y="3911652"/>
+            <a:off x="6046393" y="3911652"/>
             <a:ext cx="73025" cy="72000"/>
           </a:xfrm>
           <a:prstGeom prst="ellipse">
@@ -14104,7 +14088,7 @@
         </p:nvSpPr>
         <p:spPr>
           <a:xfrm>
-            <a:off x="5612347" y="3728748"/>
+            <a:off x="5634572" y="3728748"/>
             <a:ext cx="73025" cy="72000"/>
           </a:xfrm>
           <a:prstGeom prst="ellipse">
@@ -14150,7 +14134,7 @@
         </p:nvSpPr>
         <p:spPr>
           <a:xfrm>
-            <a:off x="5741072" y="3165427"/>
+            <a:off x="5763297" y="3165427"/>
             <a:ext cx="252000" cy="252000"/>
           </a:xfrm>
           <a:prstGeom prst="ellipse">
@@ -14199,7 +14183,7 @@
         </p:nvSpPr>
         <p:spPr bwMode="auto">
           <a:xfrm>
-            <a:off x="6051533" y="4070988"/>
+            <a:off x="6073758" y="4070988"/>
             <a:ext cx="252000" cy="252000"/>
           </a:xfrm>
           <a:prstGeom prst="rect">
@@ -14227,7 +14211,6 @@
               <a:solidFill>
                 <a:schemeClr val="tx1"/>
               </a:solidFill>
-              <a:latin typeface="Microsoft Sans Serif"/>
               <a:cs typeface="Microsoft Sans Serif"/>
             </a:endParaRPr>
           </a:p>
@@ -14241,7 +14224,7 @@
         </p:nvSpPr>
         <p:spPr>
           <a:xfrm>
-            <a:off x="5756082" y="3597500"/>
+            <a:off x="5778307" y="3597500"/>
             <a:ext cx="252000" cy="252000"/>
           </a:xfrm>
           <a:prstGeom prst="ellipse">
@@ -14288,7 +14271,7 @@
         </p:nvSpPr>
         <p:spPr>
           <a:xfrm>
-            <a:off x="6600397" y="4064368"/>
+            <a:off x="6622622" y="4064368"/>
             <a:ext cx="252000" cy="252000"/>
           </a:xfrm>
           <a:prstGeom prst="ellipse">
@@ -14337,8 +14320,8 @@
         </p:nvSpPr>
         <p:spPr bwMode="auto">
           <a:xfrm>
-            <a:off x="6134100" y="1854000"/>
-            <a:ext cx="1060451" cy="276999"/>
+            <a:off x="6188076" y="1854000"/>
+            <a:ext cx="1006476" cy="276999"/>
           </a:xfrm>
           <a:prstGeom prst="rect">
             <a:avLst/>
@@ -14486,7 +14469,7 @@
                 <a:solidFill>
                   <a:schemeClr val="tx1"/>
                 </a:solidFill>
-                <a:latin typeface="Microsoft Sans Serif"/>
+                <a:latin typeface="+mn-lt"/>
                 <a:cs typeface="Microsoft Sans Serif"/>
               </a:rPr>
               <a:t>Scale load/size:</a:t>
@@ -14499,7 +14482,7 @@
                 <a:solidFill>
                   <a:schemeClr val="tx1"/>
                 </a:solidFill>
-                <a:latin typeface="Microsoft Sans Serif"/>
+                <a:latin typeface="+mn-lt"/>
                 <a:cs typeface="Microsoft Sans Serif"/>
               </a:rPr>
               <a:t>eight transitions</a:t>
@@ -14517,7 +14500,7 @@
         </p:nvSpPr>
         <p:spPr bwMode="auto">
           <a:xfrm>
-            <a:off x="5810184" y="1786158"/>
+            <a:off x="5825586" y="1786158"/>
             <a:ext cx="72000" cy="72000"/>
           </a:xfrm>
           <a:prstGeom prst="rect">
@@ -14545,7 +14528,6 @@
               <a:solidFill>
                 <a:schemeClr val="tx1"/>
               </a:solidFill>
-              <a:latin typeface="Microsoft Sans Serif"/>
               <a:cs typeface="Microsoft Sans Serif"/>
             </a:endParaRPr>
           </a:p>
@@ -14561,7 +14543,7 @@
         </p:nvSpPr>
         <p:spPr bwMode="auto">
           <a:xfrm>
-            <a:off x="5810184" y="2121490"/>
+            <a:off x="5825586" y="2121490"/>
             <a:ext cx="72000" cy="72000"/>
           </a:xfrm>
           <a:prstGeom prst="rect">
@@ -14589,7 +14571,6 @@
               <a:solidFill>
                 <a:schemeClr val="tx1"/>
               </a:solidFill>
-              <a:latin typeface="Microsoft Sans Serif"/>
               <a:cs typeface="Microsoft Sans Serif"/>
             </a:endParaRPr>
           </a:p>
@@ -14605,7 +14586,7 @@
         </p:nvSpPr>
         <p:spPr bwMode="auto">
           <a:xfrm>
-            <a:off x="5633458" y="1952262"/>
+            <a:off x="5648860" y="1952262"/>
             <a:ext cx="72000" cy="72000"/>
           </a:xfrm>
           <a:prstGeom prst="rect">
@@ -14633,7 +14614,6 @@
               <a:solidFill>
                 <a:schemeClr val="tx1"/>
               </a:solidFill>
-              <a:latin typeface="Microsoft Sans Serif"/>
               <a:cs typeface="Microsoft Sans Serif"/>
             </a:endParaRPr>
           </a:p>
@@ -14649,7 +14629,7 @@
         </p:nvSpPr>
         <p:spPr bwMode="auto">
           <a:xfrm>
-            <a:off x="5979533" y="1952262"/>
+            <a:off x="5994935" y="1952262"/>
             <a:ext cx="72000" cy="72000"/>
           </a:xfrm>
           <a:prstGeom prst="rect">
@@ -14677,7 +14657,6 @@
               <a:solidFill>
                 <a:schemeClr val="tx1"/>
               </a:solidFill>
-              <a:latin typeface="Microsoft Sans Serif"/>
               <a:cs typeface="Microsoft Sans Serif"/>
             </a:endParaRPr>
           </a:p>
@@ -14693,7 +14672,7 @@
         </p:nvSpPr>
         <p:spPr bwMode="auto">
           <a:xfrm>
-            <a:off x="5923407" y="1827131"/>
+            <a:off x="5938809" y="1827131"/>
             <a:ext cx="72000" cy="72000"/>
           </a:xfrm>
           <a:prstGeom prst="rect">
@@ -14721,7 +14700,6 @@
               <a:solidFill>
                 <a:schemeClr val="tx1"/>
               </a:solidFill>
-              <a:latin typeface="Microsoft Sans Serif"/>
               <a:cs typeface="Microsoft Sans Serif"/>
             </a:endParaRPr>
           </a:p>
@@ -14737,7 +14715,7 @@
         </p:nvSpPr>
         <p:spPr bwMode="auto">
           <a:xfrm>
-            <a:off x="5923407" y="2068126"/>
+            <a:off x="5938809" y="2068126"/>
             <a:ext cx="72000" cy="72000"/>
           </a:xfrm>
           <a:prstGeom prst="rect">
@@ -14765,7 +14743,6 @@
               <a:solidFill>
                 <a:schemeClr val="tx1"/>
               </a:solidFill>
-              <a:latin typeface="Microsoft Sans Serif"/>
               <a:cs typeface="Microsoft Sans Serif"/>
             </a:endParaRPr>
           </a:p>
@@ -14781,7 +14758,7 @@
         </p:nvSpPr>
         <p:spPr bwMode="auto">
           <a:xfrm>
-            <a:off x="5687045" y="2074476"/>
+            <a:off x="5702447" y="2074476"/>
             <a:ext cx="72000" cy="72000"/>
           </a:xfrm>
           <a:prstGeom prst="rect">
@@ -14809,7 +14786,6 @@
               <a:solidFill>
                 <a:schemeClr val="tx1"/>
               </a:solidFill>
-              <a:latin typeface="Microsoft Sans Serif"/>
               <a:cs typeface="Microsoft Sans Serif"/>
             </a:endParaRPr>
           </a:p>
@@ -14825,7 +14801,7 @@
         </p:nvSpPr>
         <p:spPr bwMode="auto">
           <a:xfrm>
-            <a:off x="5695933" y="1827131"/>
+            <a:off x="5711335" y="1827131"/>
             <a:ext cx="72000" cy="72000"/>
           </a:xfrm>
           <a:prstGeom prst="rect">
@@ -14853,7 +14829,6 @@
               <a:solidFill>
                 <a:schemeClr val="tx1"/>
               </a:solidFill>
-              <a:latin typeface="Microsoft Sans Serif"/>
               <a:cs typeface="Microsoft Sans Serif"/>
             </a:endParaRPr>
           </a:p>
@@ -14869,8 +14844,8 @@
         </p:nvSpPr>
         <p:spPr bwMode="auto">
           <a:xfrm>
-            <a:off x="5612348" y="4447930"/>
-            <a:ext cx="1582203" cy="553998"/>
+            <a:off x="5648860" y="4447930"/>
+            <a:ext cx="1545691" cy="553998"/>
           </a:xfrm>
           <a:prstGeom prst="rect">
             <a:avLst/>
@@ -15018,10 +14993,46 @@
                 <a:solidFill>
                   <a:schemeClr val="tx1"/>
                 </a:solidFill>
-                <a:latin typeface="Microsoft Sans Serif"/>
+                <a:latin typeface="+mn-lt"/>
                 <a:cs typeface="Microsoft Sans Serif"/>
               </a:rPr>
               <a:t>Constraints:</a:t>
+            </a:r>
+          </a:p>
+          <a:p>
+            <a:pPr marL="228600" indent="-228600" eaLnBrk="1" hangingPunct="1">
+              <a:buFont typeface="+mj-lt"/>
+              <a:buAutoNum type="arabicParenR"/>
+            </a:pPr>
+            <a:r>
+              <a:rPr lang="en-GB" sz="900" b="0" i="1" dirty="0">
+                <a:solidFill>
+                  <a:schemeClr val="tx1"/>
+                </a:solidFill>
+                <a:latin typeface="+mn-lt"/>
+                <a:cs typeface="Microsoft Sans Serif"/>
+              </a:rPr>
+              <a:t>b</a:t>
+            </a:r>
+            <a:r>
+              <a:rPr lang="en-GB" sz="900" b="0" i="1" dirty="0" smtClean="0">
+                <a:solidFill>
+                  <a:schemeClr val="tx1"/>
+                </a:solidFill>
+                <a:latin typeface="+mn-lt"/>
+                <a:cs typeface="Microsoft Sans Serif"/>
+              </a:rPr>
+              <a:t>ase </a:t>
+            </a:r>
+            <a:r>
+              <a:rPr lang="en-GB" sz="900" b="0" i="1" dirty="0" smtClean="0">
+                <a:solidFill>
+                  <a:schemeClr val="tx1"/>
+                </a:solidFill>
+                <a:latin typeface="+mn-lt"/>
+                <a:cs typeface="Microsoft Sans Serif"/>
+              </a:rPr>
+              <a:t>load per transition ≥ 0</a:t>
             </a:r>
           </a:p>
           <a:p>
@@ -15034,47 +15045,51 @@
                 <a:solidFill>
                   <a:schemeClr val="tx1"/>
                 </a:solidFill>
-                <a:latin typeface="Microsoft Sans Serif"/>
+                <a:latin typeface="+mn-lt"/>
                 <a:cs typeface="Microsoft Sans Serif"/>
               </a:rPr>
-              <a:t>Base load per transition ≥ 0</a:t>
-            </a:r>
-          </a:p>
-          <a:p>
-            <a:pPr marL="228600" indent="-228600" eaLnBrk="1" hangingPunct="1">
-              <a:buFont typeface="+mj-lt"/>
-              <a:buAutoNum type="arabicParenR"/>
-            </a:pPr>
-            <a:r>
-              <a:rPr lang="en-GB" sz="900" b="0" i="1" dirty="0" smtClean="0">
-                <a:solidFill>
-                  <a:schemeClr val="tx1"/>
-                </a:solidFill>
-                <a:latin typeface="Microsoft Sans Serif"/>
-                <a:cs typeface="Microsoft Sans Serif"/>
-              </a:rPr>
-              <a:t>Invalidation load </a:t>
-            </a:r>
-            <a:r>
-              <a:rPr lang="en-GB" sz="900" b="0" i="1" dirty="0">
-                <a:solidFill>
-                  <a:schemeClr val="tx1"/>
-                </a:solidFill>
-                <a:latin typeface="Microsoft Sans Serif"/>
-                <a:cs typeface="Microsoft Sans Serif"/>
-              </a:rPr>
-              <a:t>≥ </a:t>
+              <a:t>2 ≤ invalidation </a:t>
             </a:r>
             <a:r>
               <a:rPr lang="en-GB" sz="900" b="0" i="1" dirty="0" smtClean="0">
                 <a:solidFill>
                   <a:schemeClr val="tx1"/>
                 </a:solidFill>
-                <a:latin typeface="Microsoft Sans Serif"/>
+                <a:latin typeface="+mn-lt"/>
                 <a:cs typeface="Microsoft Sans Serif"/>
               </a:rPr>
-              <a:t>2           ≤ scale load</a:t>
+              <a:t>load ≤   </a:t>
             </a:r>
+          </a:p>
+          <a:p>
+            <a:pPr eaLnBrk="1" hangingPunct="1"/>
+            <a:r>
+              <a:rPr lang="en-GB" sz="900" b="0" i="1" dirty="0" smtClean="0">
+                <a:solidFill>
+                  <a:schemeClr val="tx1"/>
+                </a:solidFill>
+                <a:latin typeface="+mn-lt"/>
+                <a:cs typeface="Microsoft Sans Serif"/>
+              </a:rPr>
+              <a:t>              </a:t>
+            </a:r>
+            <a:r>
+              <a:rPr lang="en-GB" sz="900" b="0" i="1" dirty="0" smtClean="0">
+                <a:solidFill>
+                  <a:schemeClr val="tx1"/>
+                </a:solidFill>
+                <a:latin typeface="+mn-lt"/>
+                <a:cs typeface="Microsoft Sans Serif"/>
+              </a:rPr>
+              <a:t>scale load</a:t>
+            </a:r>
+            <a:endParaRPr lang="en-GB" sz="900" b="0" i="1" dirty="0" smtClean="0">
+              <a:solidFill>
+                <a:schemeClr val="tx1"/>
+              </a:solidFill>
+              <a:latin typeface="+mn-lt"/>
+              <a:cs typeface="Microsoft Sans Serif"/>
+            </a:endParaRPr>
           </a:p>
         </p:txBody>
       </p:sp>

</xml_diff>